<commit_message>
Update main class diagram
</commit_message>
<xml_diff>
--- a/doc/Diagrams.pptx
+++ b/doc/Diagrams.pptx
@@ -5,12 +5,11 @@
     <p:sldMasterId id="2147483648" r:id="rId1"/>
   </p:sldMasterIdLst>
   <p:notesMasterIdLst>
-    <p:notesMasterId r:id="rId5"/>
+    <p:notesMasterId r:id="rId4"/>
   </p:notesMasterIdLst>
   <p:sldIdLst>
     <p:sldId id="256" r:id="rId2"/>
     <p:sldId id="257" r:id="rId3"/>
-    <p:sldId id="258" r:id="rId4"/>
   </p:sldIdLst>
   <p:sldSz cx="9144000" cy="6858000" type="screen4x3"/>
   <p:notesSz cx="6858000" cy="9144000"/>
@@ -109,6 +108,22 @@
       </a:defRPr>
     </a:lvl9pPr>
   </p:defaultTextStyle>
+  <p:extLst>
+    <p:ext uri="{EFAFB233-063F-42B5-8137-9DF3F51BA10A}">
+      <p15:sldGuideLst xmlns:p15="http://schemas.microsoft.com/office/powerpoint/2012/main">
+        <p15:guide id="1" orient="horz" pos="2160">
+          <p15:clr>
+            <a:srgbClr val="A4A3A4"/>
+          </p15:clr>
+        </p15:guide>
+        <p15:guide id="2" pos="2880">
+          <p15:clr>
+            <a:srgbClr val="A4A3A4"/>
+          </p15:clr>
+        </p15:guide>
+      </p15:sldGuideLst>
+    </p:ext>
+  </p:extLst>
 </p:presentation>
 </file>
 
@@ -194,7 +209,7 @@
           <a:p>
             <a:fld id="{F5CC4B3F-88C1-4FFA-B1B6-F41C21DC6924}" type="datetimeFigureOut">
               <a:rPr lang="en-US" smtClean="0"/>
-              <a:t>9/12/2016</a:t>
+              <a:t>9/18/16</a:t>
             </a:fld>
             <a:endParaRPr lang="en-US"/>
           </a:p>
@@ -727,7 +742,7 @@
           <a:p>
             <a:fld id="{78C97017-6FC3-485B-9764-EAC9E56C1D49}" type="datetimeFigureOut">
               <a:rPr lang="en-US" smtClean="0"/>
-              <a:t>9/12/2016</a:t>
+              <a:t>9/18/16</a:t>
             </a:fld>
             <a:endParaRPr lang="en-US"/>
           </a:p>
@@ -897,7 +912,7 @@
           <a:p>
             <a:fld id="{78C97017-6FC3-485B-9764-EAC9E56C1D49}" type="datetimeFigureOut">
               <a:rPr lang="en-US" smtClean="0"/>
-              <a:t>9/12/2016</a:t>
+              <a:t>9/18/16</a:t>
             </a:fld>
             <a:endParaRPr lang="en-US"/>
           </a:p>
@@ -1077,7 +1092,7 @@
           <a:p>
             <a:fld id="{78C97017-6FC3-485B-9764-EAC9E56C1D49}" type="datetimeFigureOut">
               <a:rPr lang="en-US" smtClean="0"/>
-              <a:t>9/12/2016</a:t>
+              <a:t>9/18/16</a:t>
             </a:fld>
             <a:endParaRPr lang="en-US"/>
           </a:p>
@@ -1247,7 +1262,7 @@
           <a:p>
             <a:fld id="{78C97017-6FC3-485B-9764-EAC9E56C1D49}" type="datetimeFigureOut">
               <a:rPr lang="en-US" smtClean="0"/>
-              <a:t>9/12/2016</a:t>
+              <a:t>9/18/16</a:t>
             </a:fld>
             <a:endParaRPr lang="en-US"/>
           </a:p>
@@ -1493,7 +1508,7 @@
           <a:p>
             <a:fld id="{78C97017-6FC3-485B-9764-EAC9E56C1D49}" type="datetimeFigureOut">
               <a:rPr lang="en-US" smtClean="0"/>
-              <a:t>9/12/2016</a:t>
+              <a:t>9/18/16</a:t>
             </a:fld>
             <a:endParaRPr lang="en-US"/>
           </a:p>
@@ -1781,7 +1796,7 @@
           <a:p>
             <a:fld id="{78C97017-6FC3-485B-9764-EAC9E56C1D49}" type="datetimeFigureOut">
               <a:rPr lang="en-US" smtClean="0"/>
-              <a:t>9/12/2016</a:t>
+              <a:t>9/18/16</a:t>
             </a:fld>
             <a:endParaRPr lang="en-US"/>
           </a:p>
@@ -2203,7 +2218,7 @@
           <a:p>
             <a:fld id="{78C97017-6FC3-485B-9764-EAC9E56C1D49}" type="datetimeFigureOut">
               <a:rPr lang="en-US" smtClean="0"/>
-              <a:t>9/12/2016</a:t>
+              <a:t>9/18/16</a:t>
             </a:fld>
             <a:endParaRPr lang="en-US"/>
           </a:p>
@@ -2321,7 +2336,7 @@
           <a:p>
             <a:fld id="{78C97017-6FC3-485B-9764-EAC9E56C1D49}" type="datetimeFigureOut">
               <a:rPr lang="en-US" smtClean="0"/>
-              <a:t>9/12/2016</a:t>
+              <a:t>9/18/16</a:t>
             </a:fld>
             <a:endParaRPr lang="en-US"/>
           </a:p>
@@ -2416,7 +2431,7 @@
           <a:p>
             <a:fld id="{78C97017-6FC3-485B-9764-EAC9E56C1D49}" type="datetimeFigureOut">
               <a:rPr lang="en-US" smtClean="0"/>
-              <a:t>9/12/2016</a:t>
+              <a:t>9/18/16</a:t>
             </a:fld>
             <a:endParaRPr lang="en-US"/>
           </a:p>
@@ -2693,7 +2708,7 @@
           <a:p>
             <a:fld id="{78C97017-6FC3-485B-9764-EAC9E56C1D49}" type="datetimeFigureOut">
               <a:rPr lang="en-US" smtClean="0"/>
-              <a:t>9/12/2016</a:t>
+              <a:t>9/18/16</a:t>
             </a:fld>
             <a:endParaRPr lang="en-US"/>
           </a:p>
@@ -2946,7 +2961,7 @@
           <a:p>
             <a:fld id="{78C97017-6FC3-485B-9764-EAC9E56C1D49}" type="datetimeFigureOut">
               <a:rPr lang="en-US" smtClean="0"/>
-              <a:t>9/12/2016</a:t>
+              <a:t>9/18/16</a:t>
             </a:fld>
             <a:endParaRPr lang="en-US"/>
           </a:p>
@@ -3159,7 +3174,7 @@
           <a:p>
             <a:fld id="{78C97017-6FC3-485B-9764-EAC9E56C1D49}" type="datetimeFigureOut">
               <a:rPr lang="en-US" smtClean="0"/>
-              <a:t>9/12/2016</a:t>
+              <a:t>9/18/16</a:t>
             </a:fld>
             <a:endParaRPr lang="en-US"/>
           </a:p>
@@ -3626,7 +3641,7 @@
         </p:nvSpPr>
         <p:spPr>
           <a:xfrm>
-            <a:off x="411820" y="3920440"/>
+            <a:off x="246752" y="4904187"/>
             <a:ext cx="400979" cy="346760"/>
           </a:xfrm>
           <a:prstGeom prst="rect">
@@ -3685,7 +3700,7 @@
         </p:nvSpPr>
         <p:spPr>
           <a:xfrm>
-            <a:off x="1143973" y="3913809"/>
+            <a:off x="927426" y="4904187"/>
             <a:ext cx="581331" cy="346760"/>
           </a:xfrm>
           <a:prstGeom prst="rect">
@@ -3744,7 +3759,7 @@
         </p:nvSpPr>
         <p:spPr>
           <a:xfrm>
-            <a:off x="3483098" y="3747060"/>
+            <a:off x="3338413" y="4180687"/>
             <a:ext cx="929296" cy="346760"/>
           </a:xfrm>
           <a:prstGeom prst="rect">
@@ -3799,7 +3814,7 @@
         </p:nvSpPr>
         <p:spPr>
           <a:xfrm>
-            <a:off x="2743200" y="3006040"/>
+            <a:off x="2584454" y="3006040"/>
             <a:ext cx="634723" cy="346760"/>
           </a:xfrm>
           <a:prstGeom prst="rect">
@@ -3810,7 +3825,6 @@
               <a:srgbClr val="0070C0"/>
             </a:solidFill>
           </a:ln>
-          <a:effectLst/>
         </p:spPr>
         <p:style>
           <a:lnRef idx="1">
@@ -3847,7 +3861,7 @@
         </p:nvSpPr>
         <p:spPr>
           <a:xfrm>
-            <a:off x="5099296" y="3032560"/>
+            <a:off x="4994970" y="3482275"/>
             <a:ext cx="929296" cy="346760"/>
           </a:xfrm>
           <a:prstGeom prst="rect">
@@ -3898,7 +3912,7 @@
         </p:nvSpPr>
         <p:spPr>
           <a:xfrm>
-            <a:off x="5072919" y="4352685"/>
+            <a:off x="4968593" y="4802400"/>
             <a:ext cx="929296" cy="346760"/>
           </a:xfrm>
           <a:prstGeom prst="rect">
@@ -3949,7 +3963,7 @@
         </p:nvSpPr>
         <p:spPr>
           <a:xfrm>
-            <a:off x="6637708" y="4352685"/>
+            <a:off x="6547670" y="4802400"/>
             <a:ext cx="929296" cy="346760"/>
           </a:xfrm>
           <a:prstGeom prst="rect">
@@ -4008,7 +4022,7 @@
         </p:nvSpPr>
         <p:spPr>
           <a:xfrm>
-            <a:off x="8200050" y="4036277"/>
+            <a:off x="8095724" y="4485992"/>
             <a:ext cx="929296" cy="346760"/>
           </a:xfrm>
           <a:prstGeom prst="rect">
@@ -4052,7 +4066,7 @@
         </p:nvSpPr>
         <p:spPr>
           <a:xfrm>
-            <a:off x="8200050" y="4495800"/>
+            <a:off x="8095724" y="4945515"/>
             <a:ext cx="929296" cy="346760"/>
           </a:xfrm>
           <a:prstGeom prst="rect">
@@ -4096,7 +4110,7 @@
         </p:nvSpPr>
         <p:spPr>
           <a:xfrm>
-            <a:off x="8200050" y="4953000"/>
+            <a:off x="8095724" y="5402715"/>
             <a:ext cx="929296" cy="346760"/>
           </a:xfrm>
           <a:prstGeom prst="rect">
@@ -4140,7 +4154,7 @@
         </p:nvSpPr>
         <p:spPr>
           <a:xfrm>
-            <a:off x="2410207" y="4460471"/>
+            <a:off x="2265522" y="4910537"/>
             <a:ext cx="790193" cy="346760"/>
           </a:xfrm>
           <a:prstGeom prst="rect">
@@ -4201,9 +4215,9 @@
           <p:nvPr/>
         </p:nvCxnSpPr>
         <p:spPr>
-          <a:xfrm rot="10800000" flipV="1">
-            <a:off x="812799" y="4087188"/>
-            <a:ext cx="331174" cy="6631"/>
+          <a:xfrm rot="10800000">
+            <a:off x="647732" y="5077567"/>
+            <a:ext cx="279695" cy="12700"/>
           </a:xfrm>
           <a:prstGeom prst="bentConnector3">
             <a:avLst>
@@ -4242,8 +4256,8 @@
         </p:nvCxnSpPr>
         <p:spPr>
           <a:xfrm rot="5400000" flipH="1" flipV="1">
-            <a:off x="2793471" y="3541515"/>
-            <a:ext cx="342611" cy="12700"/>
+            <a:off x="2431205" y="3752288"/>
+            <a:ext cx="756904" cy="5448"/>
           </a:xfrm>
           <a:prstGeom prst="bentConnector3">
             <a:avLst>
@@ -4286,8 +4300,8 @@
         </p:nvCxnSpPr>
         <p:spPr>
           <a:xfrm rot="5400000">
-            <a:off x="2646817" y="4301983"/>
-            <a:ext cx="316975" cy="12700"/>
+            <a:off x="2493912" y="4743830"/>
+            <a:ext cx="333414" cy="12700"/>
           </a:xfrm>
           <a:prstGeom prst="bentConnector3">
             <a:avLst>
@@ -4322,14 +4336,13 @@
         <p:nvCxnSpPr>
           <p:cNvPr id="48" name="Elbow Connector 47"/>
           <p:cNvCxnSpPr>
-            <a:stCxn id="106" idx="3"/>
             <a:endCxn id="15" idx="1"/>
           </p:cNvCxnSpPr>
           <p:nvPr/>
         </p:nvCxnSpPr>
         <p:spPr>
           <a:xfrm flipV="1">
-            <a:off x="4648442" y="3205940"/>
+            <a:off x="4544116" y="3655655"/>
             <a:ext cx="450854" cy="712546"/>
           </a:xfrm>
           <a:prstGeom prst="bentConnector3">
@@ -4359,15 +4372,12 @@
       <p:cxnSp>
         <p:nvCxnSpPr>
           <p:cNvPr id="51" name="Elbow Connector 50"/>
-          <p:cNvCxnSpPr>
-            <a:stCxn id="106" idx="3"/>
-            <a:endCxn id="16" idx="1"/>
-          </p:cNvCxnSpPr>
+          <p:cNvCxnSpPr/>
           <p:nvPr/>
         </p:nvCxnSpPr>
         <p:spPr>
           <a:xfrm>
-            <a:off x="4648442" y="3918486"/>
+            <a:off x="4535249" y="4372564"/>
             <a:ext cx="424477" cy="607579"/>
           </a:xfrm>
           <a:prstGeom prst="bentConnector3">
@@ -4407,8 +4417,8 @@
         </p:nvCxnSpPr>
         <p:spPr>
           <a:xfrm rot="5400000" flipH="1" flipV="1">
-            <a:off x="6615674" y="3866003"/>
-            <a:ext cx="973365" cy="12700"/>
+            <a:off x="6531769" y="4321851"/>
+            <a:ext cx="961098" cy="12700"/>
           </a:xfrm>
           <a:prstGeom prst="bentConnector3">
             <a:avLst>
@@ -4450,7 +4460,7 @@
         </p:nvCxnSpPr>
         <p:spPr>
           <a:xfrm flipV="1">
-            <a:off x="7803052" y="4209657"/>
+            <a:off x="7698726" y="4659372"/>
             <a:ext cx="396998" cy="312434"/>
           </a:xfrm>
           <a:prstGeom prst="bentConnector3">
@@ -4493,7 +4503,7 @@
         </p:nvCxnSpPr>
         <p:spPr>
           <a:xfrm>
-            <a:off x="7803052" y="4522091"/>
+            <a:off x="7698726" y="4971806"/>
             <a:ext cx="396998" cy="147089"/>
           </a:xfrm>
           <a:prstGeom prst="bentConnector3">
@@ -4536,7 +4546,7 @@
         </p:nvCxnSpPr>
         <p:spPr>
           <a:xfrm>
-            <a:off x="7803052" y="4522091"/>
+            <a:off x="7698726" y="4971806"/>
             <a:ext cx="396998" cy="604289"/>
           </a:xfrm>
           <a:prstGeom prst="bentConnector3">
@@ -4576,7 +4586,7 @@
         </p:nvSpPr>
         <p:spPr>
           <a:xfrm>
-            <a:off x="6637708" y="3032560"/>
+            <a:off x="6547670" y="3494542"/>
             <a:ext cx="929296" cy="346760"/>
           </a:xfrm>
           <a:prstGeom prst="rect">
@@ -4620,7 +4630,7 @@
         </p:nvSpPr>
         <p:spPr>
           <a:xfrm>
-            <a:off x="7567004" y="4435401"/>
+            <a:off x="7462678" y="4885116"/>
             <a:ext cx="236048" cy="173380"/>
           </a:xfrm>
           <a:prstGeom prst="flowChartDecision">
@@ -4671,7 +4681,7 @@
         </p:nvSpPr>
         <p:spPr>
           <a:xfrm>
-            <a:off x="6028592" y="3131950"/>
+            <a:off x="5924266" y="3581665"/>
             <a:ext cx="236048" cy="173380"/>
           </a:xfrm>
           <a:prstGeom prst="flowChartDecision">
@@ -4712,7 +4722,7 @@
         </p:nvSpPr>
         <p:spPr>
           <a:xfrm>
-            <a:off x="5992191" y="4439375"/>
+            <a:off x="5887865" y="4889090"/>
             <a:ext cx="236048" cy="173380"/>
           </a:xfrm>
           <a:prstGeom prst="flowChartDecision">
@@ -4753,7 +4763,7 @@
         </p:nvSpPr>
         <p:spPr>
           <a:xfrm>
-            <a:off x="4412394" y="3831796"/>
+            <a:off x="4286455" y="4281355"/>
             <a:ext cx="236048" cy="173380"/>
           </a:xfrm>
           <a:prstGeom prst="flowChartDecision">
@@ -4799,8 +4809,8 @@
         </p:nvCxnSpPr>
         <p:spPr>
           <a:xfrm flipV="1">
-            <a:off x="6264640" y="3205940"/>
-            <a:ext cx="373068" cy="12700"/>
+            <a:off x="6160314" y="3667922"/>
+            <a:ext cx="387356" cy="433"/>
           </a:xfrm>
           <a:prstGeom prst="straightConnector1">
             <a:avLst/>
@@ -4837,8 +4847,8 @@
         </p:nvCxnSpPr>
         <p:spPr>
           <a:xfrm>
-            <a:off x="6228239" y="4526065"/>
-            <a:ext cx="409469" cy="0"/>
+            <a:off x="6123913" y="4975780"/>
+            <a:ext cx="423757" cy="0"/>
           </a:xfrm>
           <a:prstGeom prst="straightConnector1">
             <a:avLst/>
@@ -4872,7 +4882,7 @@
         </p:nvSpPr>
         <p:spPr>
           <a:xfrm>
-            <a:off x="6363802" y="5140408"/>
+            <a:off x="6259476" y="5590123"/>
             <a:ext cx="1408598" cy="346760"/>
           </a:xfrm>
           <a:prstGeom prst="rect">
@@ -4925,12 +4935,12 @@
         </p:nvCxnSpPr>
         <p:spPr>
           <a:xfrm>
-            <a:off x="304800" y="3006041"/>
-            <a:ext cx="6059002" cy="2307747"/>
+            <a:off x="146054" y="3006039"/>
+            <a:ext cx="6113422" cy="2757464"/>
           </a:xfrm>
           <a:prstGeom prst="bentConnector3">
             <a:avLst>
-              <a:gd name="adj1" fmla="val 0"/>
+              <a:gd name="adj1" fmla="val 419"/>
             </a:avLst>
           </a:prstGeom>
           <a:ln w="19050">
@@ -4966,7 +4976,7 @@
         </p:nvSpPr>
         <p:spPr>
           <a:xfrm rot="10800000">
-            <a:off x="6964221" y="4953000"/>
+            <a:off x="6859895" y="5402715"/>
             <a:ext cx="270504" cy="175523"/>
           </a:xfrm>
           <a:prstGeom prst="triangle">
@@ -5009,8 +5019,8 @@
         </p:nvCxnSpPr>
         <p:spPr>
           <a:xfrm rot="5400000">
-            <a:off x="6974138" y="4824781"/>
-            <a:ext cx="253555" cy="2883"/>
+            <a:off x="6876956" y="5267352"/>
+            <a:ext cx="253555" cy="17171"/>
           </a:xfrm>
           <a:prstGeom prst="bentConnector3">
             <a:avLst>
@@ -5050,7 +5060,7 @@
         </p:nvSpPr>
         <p:spPr>
           <a:xfrm>
-            <a:off x="3985078" y="1356188"/>
+            <a:off x="3826332" y="1356188"/>
             <a:ext cx="1611867" cy="444640"/>
           </a:xfrm>
           <a:prstGeom prst="rect">
@@ -5124,7 +5134,7 @@
         </p:nvSpPr>
         <p:spPr>
           <a:xfrm flipH="1">
-            <a:off x="6142650" y="1059080"/>
+            <a:off x="5983904" y="1059080"/>
             <a:ext cx="1404109" cy="346760"/>
           </a:xfrm>
           <a:prstGeom prst="rect">
@@ -5168,7 +5178,7 @@
         </p:nvSpPr>
         <p:spPr>
           <a:xfrm flipH="1">
-            <a:off x="6142650" y="1454067"/>
+            <a:off x="5983904" y="1454067"/>
             <a:ext cx="1404109" cy="346760"/>
           </a:xfrm>
           <a:prstGeom prst="rect">
@@ -5212,7 +5222,7 @@
         </p:nvSpPr>
         <p:spPr>
           <a:xfrm flipH="1">
-            <a:off x="6142650" y="1849054"/>
+            <a:off x="5983904" y="1849054"/>
             <a:ext cx="1404109" cy="346760"/>
           </a:xfrm>
           <a:prstGeom prst="rect">
@@ -5256,7 +5266,7 @@
         </p:nvSpPr>
         <p:spPr>
           <a:xfrm rot="16200000">
-            <a:off x="5549453" y="1571491"/>
+            <a:off x="5390707" y="1571491"/>
             <a:ext cx="270504" cy="175523"/>
           </a:xfrm>
           <a:prstGeom prst="triangle">
@@ -5299,7 +5309,7 @@
         </p:nvCxnSpPr>
         <p:spPr>
           <a:xfrm flipV="1">
-            <a:off x="5772467" y="1627447"/>
+            <a:off x="5613721" y="1627447"/>
             <a:ext cx="370183" cy="31806"/>
           </a:xfrm>
           <a:prstGeom prst="bentConnector3">
@@ -5337,7 +5347,7 @@
         </p:nvCxnSpPr>
         <p:spPr>
           <a:xfrm flipV="1">
-            <a:off x="5772467" y="1232460"/>
+            <a:off x="5613721" y="1232460"/>
             <a:ext cx="370183" cy="426793"/>
           </a:xfrm>
           <a:prstGeom prst="bentConnector3">
@@ -5375,7 +5385,7 @@
         </p:nvCxnSpPr>
         <p:spPr>
           <a:xfrm>
-            <a:off x="5772467" y="1659253"/>
+            <a:off x="5613721" y="1659253"/>
             <a:ext cx="370183" cy="363181"/>
           </a:xfrm>
           <a:prstGeom prst="bentConnector3">
@@ -5410,7 +5420,7 @@
         </p:nvSpPr>
         <p:spPr>
           <a:xfrm flipH="1">
-            <a:off x="6142650" y="2244040"/>
+            <a:off x="5983904" y="2244040"/>
             <a:ext cx="1404109" cy="346760"/>
           </a:xfrm>
           <a:prstGeom prst="rect">
@@ -5457,7 +5467,7 @@
         </p:nvCxnSpPr>
         <p:spPr>
           <a:xfrm>
-            <a:off x="5772467" y="1659253"/>
+            <a:off x="5613721" y="1659253"/>
             <a:ext cx="370183" cy="758167"/>
           </a:xfrm>
           <a:prstGeom prst="bentConnector3">
@@ -5494,7 +5504,7 @@
         </p:nvCxnSpPr>
         <p:spPr>
           <a:xfrm rot="5400000" flipH="1" flipV="1">
-            <a:off x="2764336" y="1785299"/>
+            <a:off x="2605590" y="1785299"/>
             <a:ext cx="1427532" cy="1013951"/>
           </a:xfrm>
           <a:prstGeom prst="bentConnector2">
@@ -5533,12 +5543,12 @@
         </p:nvCxnSpPr>
         <p:spPr>
           <a:xfrm rot="5400000" flipH="1" flipV="1">
-            <a:off x="2182965" y="1908384"/>
-            <a:ext cx="2256600" cy="1347626"/>
+            <a:off x="1834650" y="2117166"/>
+            <a:ext cx="2654950" cy="1328413"/>
           </a:xfrm>
           <a:prstGeom prst="bentConnector3">
             <a:avLst>
-              <a:gd name="adj1" fmla="val 99901"/>
+              <a:gd name="adj1" fmla="val 99940"/>
             </a:avLst>
           </a:prstGeom>
           <a:ln w="19050">
@@ -5574,8 +5584,8 @@
         </p:nvCxnSpPr>
         <p:spPr>
           <a:xfrm rot="5400000">
-            <a:off x="3213414" y="2790743"/>
-            <a:ext cx="1889726" cy="6348"/>
+            <a:off x="2844403" y="3001910"/>
+            <a:ext cx="2311158" cy="5447"/>
           </a:xfrm>
           <a:prstGeom prst="bentConnector3">
             <a:avLst>
@@ -5615,7 +5625,7 @@
         </p:nvSpPr>
         <p:spPr>
           <a:xfrm flipH="1">
-            <a:off x="2637450" y="720040"/>
+            <a:off x="2478704" y="720040"/>
             <a:ext cx="1404109" cy="346760"/>
           </a:xfrm>
           <a:prstGeom prst="rect">
@@ -5662,7 +5672,7 @@
         </p:nvCxnSpPr>
         <p:spPr>
           <a:xfrm rot="16200000" flipV="1">
-            <a:off x="4184902" y="750077"/>
+            <a:off x="4026156" y="750077"/>
             <a:ext cx="462768" cy="749453"/>
           </a:xfrm>
           <a:prstGeom prst="bentConnector2">
@@ -5703,7 +5713,7 @@
         </p:nvCxnSpPr>
         <p:spPr>
           <a:xfrm flipV="1">
-            <a:off x="304800" y="893420"/>
+            <a:off x="146054" y="893420"/>
             <a:ext cx="2332650" cy="1763378"/>
           </a:xfrm>
           <a:prstGeom prst="bentConnector3">
@@ -5744,7 +5754,7 @@
         </p:nvSpPr>
         <p:spPr>
           <a:xfrm>
-            <a:off x="8200050" y="3539440"/>
+            <a:off x="8095724" y="3989155"/>
             <a:ext cx="929296" cy="346760"/>
           </a:xfrm>
           <a:prstGeom prst="rect">
@@ -5791,7 +5801,7 @@
         </p:nvCxnSpPr>
         <p:spPr>
           <a:xfrm flipV="1">
-            <a:off x="7803052" y="3712820"/>
+            <a:off x="7698726" y="4162535"/>
             <a:ext cx="396998" cy="809271"/>
           </a:xfrm>
           <a:prstGeom prst="bentConnector3">
@@ -5831,7 +5841,7 @@
         </p:nvSpPr>
         <p:spPr>
           <a:xfrm>
-            <a:off x="7803052" y="874142"/>
+            <a:off x="7644306" y="874142"/>
             <a:ext cx="929296" cy="346760"/>
           </a:xfrm>
           <a:prstGeom prst="rect">
@@ -5896,7 +5906,7 @@
         </p:nvSpPr>
         <p:spPr>
           <a:xfrm>
-            <a:off x="7803052" y="1794505"/>
+            <a:off x="7644306" y="1794505"/>
             <a:ext cx="929296" cy="346760"/>
           </a:xfrm>
           <a:prstGeom prst="rect">
@@ -5961,7 +5971,7 @@
         </p:nvSpPr>
         <p:spPr>
           <a:xfrm>
-            <a:off x="5085126" y="3710497"/>
+            <a:off x="4980800" y="4160212"/>
             <a:ext cx="929296" cy="346760"/>
           </a:xfrm>
           <a:prstGeom prst="rect">
@@ -6005,7 +6015,7 @@
         </p:nvSpPr>
         <p:spPr>
           <a:xfrm>
-            <a:off x="3775013" y="4455640"/>
+            <a:off x="3347832" y="4916887"/>
             <a:ext cx="929296" cy="346760"/>
           </a:xfrm>
           <a:prstGeom prst="rect">
@@ -6016,7 +6026,6 @@
               <a:srgbClr val="00B050"/>
             </a:solidFill>
           </a:ln>
-          <a:effectLst/>
         </p:spPr>
         <p:style>
           <a:lnRef idx="1">
@@ -6055,9 +6064,9 @@
           <p:nvPr/>
         </p:nvCxnSpPr>
         <p:spPr>
-          <a:xfrm flipV="1">
-            <a:off x="3200400" y="4629020"/>
-            <a:ext cx="574613" cy="4831"/>
+          <a:xfrm>
+            <a:off x="3055715" y="5083917"/>
+            <a:ext cx="292117" cy="6350"/>
           </a:xfrm>
           <a:prstGeom prst="bentConnector3">
             <a:avLst>
@@ -6097,7 +6106,7 @@
         </p:nvCxnSpPr>
         <p:spPr>
           <a:xfrm flipV="1">
-            <a:off x="8107853" y="1199445"/>
+            <a:off x="7949107" y="1199445"/>
             <a:ext cx="0" cy="304800"/>
           </a:xfrm>
           <a:prstGeom prst="straightConnector1">
@@ -6138,7 +6147,7 @@
         </p:nvCxnSpPr>
         <p:spPr>
           <a:xfrm flipV="1">
-            <a:off x="8260253" y="1199445"/>
+            <a:off x="8101507" y="1199445"/>
             <a:ext cx="0" cy="304800"/>
           </a:xfrm>
           <a:prstGeom prst="straightConnector1">
@@ -6179,7 +6188,7 @@
         </p:nvCxnSpPr>
         <p:spPr>
           <a:xfrm flipV="1">
-            <a:off x="8412653" y="1199445"/>
+            <a:off x="8253907" y="1199445"/>
             <a:ext cx="0" cy="304800"/>
           </a:xfrm>
           <a:prstGeom prst="straightConnector1">
@@ -6220,7 +6229,7 @@
         </p:nvCxnSpPr>
         <p:spPr>
           <a:xfrm flipV="1">
-            <a:off x="8074978" y="2119808"/>
+            <a:off x="7916232" y="2119808"/>
             <a:ext cx="0" cy="304800"/>
           </a:xfrm>
           <a:prstGeom prst="straightConnector1">
@@ -6261,7 +6270,7 @@
         </p:nvCxnSpPr>
         <p:spPr>
           <a:xfrm flipV="1">
-            <a:off x="8227378" y="2119808"/>
+            <a:off x="8068632" y="2119808"/>
             <a:ext cx="0" cy="304800"/>
           </a:xfrm>
           <a:prstGeom prst="straightConnector1">
@@ -6302,7 +6311,7 @@
         </p:nvCxnSpPr>
         <p:spPr>
           <a:xfrm flipV="1">
-            <a:off x="8379778" y="2119808"/>
+            <a:off x="8221032" y="2119808"/>
             <a:ext cx="0" cy="304800"/>
           </a:xfrm>
           <a:prstGeom prst="straightConnector1">
@@ -6343,7 +6352,7 @@
         </p:nvSpPr>
         <p:spPr>
           <a:xfrm>
-            <a:off x="228600" y="2656798"/>
+            <a:off x="69854" y="2656798"/>
             <a:ext cx="1746186" cy="346760"/>
           </a:xfrm>
           <a:prstGeom prst="rect">
@@ -6403,9 +6412,9 @@
           <p:nvPr/>
         </p:nvCxnSpPr>
         <p:spPr>
-          <a:xfrm rot="5400000" flipH="1" flipV="1">
-            <a:off x="161393" y="3469523"/>
-            <a:ext cx="901834" cy="1"/>
+          <a:xfrm rot="16200000" flipV="1">
+            <a:off x="-493275" y="3963670"/>
+            <a:ext cx="1879974" cy="1060"/>
           </a:xfrm>
           <a:prstGeom prst="bentConnector3">
             <a:avLst>
@@ -6444,7 +6453,7 @@
         </p:nvSpPr>
         <p:spPr>
           <a:xfrm>
-            <a:off x="2410208" y="3700884"/>
+            <a:off x="2265523" y="4134511"/>
             <a:ext cx="790192" cy="442612"/>
           </a:xfrm>
           <a:prstGeom prst="rect">
@@ -6506,7 +6515,7 @@
         </p:nvCxnSpPr>
         <p:spPr>
           <a:xfrm flipV="1">
-            <a:off x="3200400" y="3920440"/>
+            <a:off x="3055715" y="4354067"/>
             <a:ext cx="282698" cy="1750"/>
           </a:xfrm>
           <a:prstGeom prst="straightConnector1">
@@ -6544,7 +6553,7 @@
         </p:nvSpPr>
         <p:spPr>
           <a:xfrm>
-            <a:off x="986679" y="1995549"/>
+            <a:off x="827933" y="1995549"/>
             <a:ext cx="756639" cy="346760"/>
           </a:xfrm>
           <a:prstGeom prst="rect">
@@ -6590,7 +6599,7 @@
         </p:nvCxnSpPr>
         <p:spPr>
           <a:xfrm rot="16200000" flipV="1">
-            <a:off x="1201266" y="2506042"/>
+            <a:off x="1042520" y="2506042"/>
             <a:ext cx="336300" cy="8834"/>
           </a:xfrm>
           <a:prstGeom prst="bentConnector3">
@@ -6631,7 +6640,7 @@
         </p:nvSpPr>
         <p:spPr>
           <a:xfrm>
-            <a:off x="838200" y="3214749"/>
+            <a:off x="679866" y="3572448"/>
             <a:ext cx="1071262" cy="346760"/>
           </a:xfrm>
           <a:prstGeom prst="rect">
@@ -6683,9 +6692,9 @@
           <p:nvPr/>
         </p:nvCxnSpPr>
         <p:spPr>
-          <a:xfrm rot="5400000" flipH="1" flipV="1">
-            <a:off x="1281047" y="3114967"/>
-            <a:ext cx="192567" cy="6999"/>
+          <a:xfrm rot="16200000" flipV="1">
+            <a:off x="941176" y="3298126"/>
+            <a:ext cx="548235" cy="409"/>
           </a:xfrm>
           <a:prstGeom prst="bentConnector3">
             <a:avLst>
@@ -6725,7 +6734,7 @@
         </p:nvSpPr>
         <p:spPr>
           <a:xfrm rot="10800000" flipV="1">
-            <a:off x="1296380" y="3561884"/>
+            <a:off x="1080368" y="3933324"/>
             <a:ext cx="270504" cy="175523"/>
           </a:xfrm>
           <a:prstGeom prst="triangle">
@@ -6768,8 +6777,8 @@
         </p:nvCxnSpPr>
         <p:spPr>
           <a:xfrm rot="16200000" flipH="1">
-            <a:off x="1344934" y="3824104"/>
-            <a:ext cx="176402" cy="3007"/>
+            <a:off x="819186" y="4505281"/>
+            <a:ext cx="795340" cy="2472"/>
           </a:xfrm>
           <a:prstGeom prst="bentConnector3">
             <a:avLst>
@@ -6812,8 +6821,8 @@
         </p:nvCxnSpPr>
         <p:spPr>
           <a:xfrm>
-            <a:off x="1974786" y="2830178"/>
-            <a:ext cx="435422" cy="1092012"/>
+            <a:off x="1816040" y="2830178"/>
+            <a:ext cx="449483" cy="1525639"/>
           </a:xfrm>
           <a:prstGeom prst="bentConnector3">
             <a:avLst>
@@ -6850,17 +6859,195 @@
           <p:cNvPr id="123" name="Elbow Connector 122"/>
           <p:cNvCxnSpPr>
             <a:stCxn id="12" idx="3"/>
+            <a:endCxn id="23" idx="1"/>
           </p:cNvCxnSpPr>
           <p:nvPr/>
         </p:nvCxnSpPr>
         <p:spPr>
-          <a:xfrm flipV="1">
-            <a:off x="1725304" y="4087188"/>
-            <a:ext cx="684904" cy="1"/>
+          <a:xfrm>
+            <a:off x="1508757" y="5077567"/>
+            <a:ext cx="756765" cy="6350"/>
           </a:xfrm>
           <a:prstGeom prst="bentConnector3">
             <a:avLst>
               <a:gd name="adj1" fmla="val 50000"/>
+            </a:avLst>
+          </a:prstGeom>
+          <a:ln w="19050">
+            <a:solidFill>
+              <a:srgbClr val="C00000"/>
+            </a:solidFill>
+            <a:prstDash val="dash"/>
+            <a:headEnd type="none" w="med" len="med"/>
+            <a:tailEnd type="arrow" w="med" len="med"/>
+          </a:ln>
+          <a:effectLst/>
+        </p:spPr>
+        <p:style>
+          <a:lnRef idx="1">
+            <a:schemeClr val="accent2"/>
+          </a:lnRef>
+          <a:fillRef idx="2">
+            <a:schemeClr val="accent2"/>
+          </a:fillRef>
+          <a:effectRef idx="1">
+            <a:schemeClr val="accent2"/>
+          </a:effectRef>
+          <a:fontRef idx="minor">
+            <a:schemeClr val="dk1"/>
+          </a:fontRef>
+        </p:style>
+      </p:cxnSp>
+      <p:sp>
+        <p:nvSpPr>
+          <p:cNvPr id="105" name="Rectangle 104"/>
+          <p:cNvSpPr/>
+          <p:nvPr/>
+        </p:nvSpPr>
+        <p:spPr>
+          <a:xfrm>
+            <a:off x="6255939" y="2810707"/>
+            <a:ext cx="1412135" cy="346760"/>
+          </a:xfrm>
+          <a:prstGeom prst="rect">
+            <a:avLst/>
+          </a:prstGeom>
+          <a:ln w="19050"/>
+          <a:effectLst/>
+        </p:spPr>
+        <p:style>
+          <a:lnRef idx="1">
+            <a:schemeClr val="accent6"/>
+          </a:lnRef>
+          <a:fillRef idx="2">
+            <a:schemeClr val="accent6"/>
+          </a:fillRef>
+          <a:effectRef idx="1">
+            <a:schemeClr val="accent6"/>
+          </a:effectRef>
+          <a:fontRef idx="minor">
+            <a:schemeClr val="dk1"/>
+          </a:fontRef>
+        </p:style>
+        <p:txBody>
+          <a:bodyPr rtlCol="0" anchor="ctr"/>
+          <a:lstStyle/>
+          <a:p>
+            <a:pPr algn="ctr"/>
+            <a:r>
+              <a:rPr lang="en-US" sz="1050" dirty="0" smtClean="0"/>
+              <a:t>&lt;&lt;interface&gt;&gt;</a:t>
+            </a:r>
+          </a:p>
+          <a:p>
+            <a:pPr algn="ctr"/>
+            <a:r>
+              <a:rPr lang="en-US" sz="1050" dirty="0" err="1" smtClean="0"/>
+              <a:t>ReadOnlyTag</a:t>
+            </a:r>
+            <a:endParaRPr lang="en-SG" sz="1050" dirty="0"/>
+          </a:p>
+        </p:txBody>
+      </p:sp>
+      <p:sp>
+        <p:nvSpPr>
+          <p:cNvPr id="112" name="Isosceles Triangle 134"/>
+          <p:cNvSpPr/>
+          <p:nvPr/>
+        </p:nvSpPr>
+        <p:spPr>
+          <a:xfrm>
+            <a:off x="6841917" y="3157467"/>
+            <a:ext cx="270504" cy="144567"/>
+          </a:xfrm>
+          <a:prstGeom prst="triangle">
+            <a:avLst/>
+          </a:prstGeom>
+          <a:ln w="19050"/>
+          <a:effectLst/>
+        </p:spPr>
+        <p:style>
+          <a:lnRef idx="1">
+            <a:schemeClr val="accent6"/>
+          </a:lnRef>
+          <a:fillRef idx="2">
+            <a:schemeClr val="accent6"/>
+          </a:fillRef>
+          <a:effectRef idx="1">
+            <a:schemeClr val="accent6"/>
+          </a:effectRef>
+          <a:fontRef idx="minor">
+            <a:schemeClr val="dk1"/>
+          </a:fontRef>
+        </p:style>
+        <p:txBody>
+          <a:bodyPr rtlCol="0" anchor="ctr"/>
+          <a:lstStyle/>
+          <a:p>
+            <a:pPr algn="ctr"/>
+            <a:endParaRPr lang="en-SG" sz="1050"/>
+          </a:p>
+        </p:txBody>
+      </p:sp>
+      <p:cxnSp>
+        <p:nvCxnSpPr>
+          <p:cNvPr id="116" name="Elbow Connector 115"/>
+          <p:cNvCxnSpPr>
+            <a:endCxn id="79" idx="0"/>
+          </p:cNvCxnSpPr>
+          <p:nvPr/>
+        </p:nvCxnSpPr>
+        <p:spPr>
+          <a:xfrm rot="16200000" flipH="1">
+            <a:off x="6925163" y="3407386"/>
+            <a:ext cx="161731" cy="12580"/>
+          </a:xfrm>
+          <a:prstGeom prst="bentConnector3">
+            <a:avLst>
+              <a:gd name="adj1" fmla="val 50000"/>
+            </a:avLst>
+          </a:prstGeom>
+          <a:ln w="19050">
+            <a:solidFill>
+              <a:schemeClr val="accent6"/>
+            </a:solidFill>
+            <a:prstDash val="dash"/>
+            <a:headEnd type="none" w="med" len="med"/>
+            <a:tailEnd type="none" w="med" len="med"/>
+          </a:ln>
+          <a:effectLst/>
+        </p:spPr>
+        <p:style>
+          <a:lnRef idx="1">
+            <a:schemeClr val="accent6"/>
+          </a:lnRef>
+          <a:fillRef idx="2">
+            <a:schemeClr val="accent6"/>
+          </a:fillRef>
+          <a:effectRef idx="1">
+            <a:schemeClr val="accent6"/>
+          </a:effectRef>
+          <a:fontRef idx="minor">
+            <a:schemeClr val="dk1"/>
+          </a:fontRef>
+        </p:style>
+      </p:cxnSp>
+      <p:cxnSp>
+        <p:nvCxnSpPr>
+          <p:cNvPr id="117" name="Elbow Connector 116"/>
+          <p:cNvCxnSpPr>
+            <a:endCxn id="105" idx="1"/>
+          </p:cNvCxnSpPr>
+          <p:nvPr/>
+        </p:nvCxnSpPr>
+        <p:spPr>
+          <a:xfrm>
+            <a:off x="1816040" y="2705024"/>
+            <a:ext cx="4439899" cy="279063"/>
+          </a:xfrm>
+          <a:prstGeom prst="bentConnector3">
+            <a:avLst>
+              <a:gd name="adj1" fmla="val 66270"/>
             </a:avLst>
           </a:prstGeom>
           <a:ln w="19050">
@@ -6898,1475 +7085,13 @@
   <p:clrMapOvr>
     <a:masterClrMapping/>
   </p:clrMapOvr>
-</p:sld>
-</file>
-
-<file path=ppt/slides/slide3.xml><?xml version="1.0" encoding="utf-8"?>
-<p:sld xmlns:a="http://schemas.openxmlformats.org/drawingml/2006/main" xmlns:r="http://schemas.openxmlformats.org/officeDocument/2006/relationships" xmlns:p="http://schemas.openxmlformats.org/presentationml/2006/main">
-  <p:cSld>
-    <p:spTree>
-      <p:nvGrpSpPr>
-        <p:cNvPr id="1" name=""/>
-        <p:cNvGrpSpPr/>
-        <p:nvPr/>
-      </p:nvGrpSpPr>
-      <p:grpSpPr>
-        <a:xfrm>
-          <a:off x="0" y="0"/>
-          <a:ext cx="0" cy="0"/>
-          <a:chOff x="0" y="0"/>
-          <a:chExt cx="0" cy="0"/>
-        </a:xfrm>
-      </p:grpSpPr>
-      <p:sp>
-        <p:nvSpPr>
-          <p:cNvPr id="2" name="Rectangle 22"/>
-          <p:cNvSpPr/>
-          <p:nvPr/>
-        </p:nvSpPr>
-        <p:spPr>
-          <a:xfrm>
-            <a:off x="2410207" y="4460471"/>
-            <a:ext cx="790193" cy="346760"/>
-          </a:xfrm>
-          <a:prstGeom prst="rect">
-            <a:avLst/>
-          </a:prstGeom>
-          <a:solidFill>
-            <a:srgbClr val="00B050"/>
-          </a:solidFill>
-          <a:ln w="19050">
-            <a:solidFill>
-              <a:srgbClr val="00B050"/>
-            </a:solidFill>
-          </a:ln>
-          <a:effectLst/>
-        </p:spPr>
-        <p:style>
-          <a:lnRef idx="1">
-            <a:schemeClr val="accent2"/>
-          </a:lnRef>
-          <a:fillRef idx="2">
-            <a:schemeClr val="accent2"/>
-          </a:fillRef>
-          <a:effectRef idx="1">
-            <a:schemeClr val="accent2"/>
-          </a:effectRef>
-          <a:fontRef idx="minor">
-            <a:schemeClr val="dk1"/>
-          </a:fontRef>
-        </p:style>
-        <p:txBody>
-          <a:bodyPr rtlCol="0" anchor="ctr"/>
-          <a:lstStyle/>
-          <a:p>
-            <a:pPr algn="ctr"/>
-            <a:r>
-              <a:rPr lang="en-US" sz="1050" dirty="0" err="1">
-                <a:solidFill>
-                  <a:schemeClr val="bg1"/>
-                </a:solidFill>
-              </a:rPr>
-              <a:t>StorageFile</a:t>
-            </a:r>
-            <a:endParaRPr lang="en-SG" sz="1050" dirty="0">
-              <a:solidFill>
-                <a:schemeClr val="bg1"/>
-              </a:solidFill>
-            </a:endParaRPr>
-          </a:p>
-        </p:txBody>
-      </p:sp>
-      <p:cxnSp>
-        <p:nvCxnSpPr>
-          <p:cNvPr id="3" name="Elbow Connector 40"/>
-          <p:cNvCxnSpPr>
-            <a:stCxn id="4" idx="2"/>
-            <a:endCxn id="2" idx="0"/>
-          </p:cNvCxnSpPr>
-          <p:nvPr/>
-        </p:nvCxnSpPr>
-        <p:spPr>
-          <a:xfrm rot="5400000">
-            <a:off x="2646817" y="4301983"/>
-            <a:ext cx="316975" cy="12700"/>
-          </a:xfrm>
-          <a:prstGeom prst="bentConnector3">
-            <a:avLst>
-              <a:gd name="adj1" fmla="val 50000"/>
-            </a:avLst>
-          </a:prstGeom>
-          <a:ln w="19050">
-            <a:solidFill>
-              <a:srgbClr val="0070C0"/>
-            </a:solidFill>
-            <a:headEnd type="none" w="med" len="med"/>
-            <a:tailEnd type="arrow" w="med" len="med"/>
-          </a:ln>
-          <a:effectLst/>
-        </p:spPr>
-        <p:style>
-          <a:lnRef idx="1">
-            <a:schemeClr val="accent2"/>
-          </a:lnRef>
-          <a:fillRef idx="2">
-            <a:schemeClr val="accent2"/>
-          </a:fillRef>
-          <a:effectRef idx="1">
-            <a:schemeClr val="accent2"/>
-          </a:effectRef>
-          <a:fontRef idx="minor">
-            <a:schemeClr val="dk1"/>
-          </a:fontRef>
-        </p:style>
-      </p:cxnSp>
-      <p:sp>
-        <p:nvSpPr>
-          <p:cNvPr id="4" name="Rectangle 65"/>
-          <p:cNvSpPr/>
-          <p:nvPr/>
-        </p:nvSpPr>
-        <p:spPr>
-          <a:xfrm>
-            <a:off x="2410208" y="3700884"/>
-            <a:ext cx="790192" cy="442612"/>
-          </a:xfrm>
-          <a:prstGeom prst="rect">
-            <a:avLst/>
-          </a:prstGeom>
-          <a:solidFill>
-            <a:srgbClr val="0070C0"/>
-          </a:solidFill>
-          <a:ln w="19050">
-            <a:solidFill>
-              <a:srgbClr val="0070C0"/>
-            </a:solidFill>
-          </a:ln>
-          <a:effectLst/>
-        </p:spPr>
-        <p:style>
-          <a:lnRef idx="1">
-            <a:schemeClr val="accent2"/>
-          </a:lnRef>
-          <a:fillRef idx="2">
-            <a:schemeClr val="accent2"/>
-          </a:fillRef>
-          <a:effectRef idx="1">
-            <a:schemeClr val="accent2"/>
-          </a:effectRef>
-          <a:fontRef idx="minor">
-            <a:schemeClr val="dk1"/>
-          </a:fontRef>
-        </p:style>
-        <p:txBody>
-          <a:bodyPr rtlCol="0" anchor="ctr"/>
-          <a:lstStyle/>
-          <a:p>
-            <a:pPr algn="ctr"/>
-            <a:r>
-              <a:rPr lang="en-US" sz="1050" dirty="0">
-                <a:solidFill>
-                  <a:schemeClr val="bg1"/>
-                </a:solidFill>
-              </a:rPr>
-              <a:t>Logic</a:t>
-            </a:r>
-            <a:endParaRPr lang="en-SG" sz="1050" dirty="0">
-              <a:solidFill>
-                <a:schemeClr val="bg1"/>
-              </a:solidFill>
-            </a:endParaRPr>
-          </a:p>
-        </p:txBody>
-      </p:sp>
-      <p:sp>
-        <p:nvSpPr>
-          <p:cNvPr id="5" name="Rectangle 65"/>
-          <p:cNvSpPr/>
-          <p:nvPr/>
-        </p:nvSpPr>
-        <p:spPr>
-          <a:xfrm>
-            <a:off x="914400" y="3707233"/>
-            <a:ext cx="790192" cy="442612"/>
-          </a:xfrm>
-          <a:prstGeom prst="rect">
-            <a:avLst/>
-          </a:prstGeom>
-          <a:ln/>
-        </p:spPr>
-        <p:style>
-          <a:lnRef idx="2">
-            <a:schemeClr val="accent1"/>
-          </a:lnRef>
-          <a:fillRef idx="1">
-            <a:schemeClr val="lt1"/>
-          </a:fillRef>
-          <a:effectRef idx="0">
-            <a:schemeClr val="accent1"/>
-          </a:effectRef>
-          <a:fontRef idx="minor">
-            <a:schemeClr val="dk1"/>
-          </a:fontRef>
-        </p:style>
-        <p:txBody>
-          <a:bodyPr rtlCol="0" anchor="ctr"/>
-          <a:lstStyle/>
-          <a:p>
-            <a:pPr algn="ctr"/>
-            <a:r>
-              <a:rPr lang="en-US" sz="1050" dirty="0" err="1" smtClean="0">
-                <a:solidFill>
-                  <a:srgbClr val="0070C0"/>
-                </a:solidFill>
-              </a:rPr>
-              <a:t>LogicTest</a:t>
-            </a:r>
-            <a:endParaRPr lang="en-SG" sz="1050" dirty="0">
-              <a:solidFill>
-                <a:srgbClr val="0070C0"/>
-              </a:solidFill>
-            </a:endParaRPr>
-          </a:p>
-        </p:txBody>
-      </p:sp>
-      <p:cxnSp>
-        <p:nvCxnSpPr>
-          <p:cNvPr id="6" name="Elbow Connector 40"/>
-          <p:cNvCxnSpPr>
-            <a:stCxn id="5" idx="3"/>
-            <a:endCxn id="4" idx="1"/>
-          </p:cNvCxnSpPr>
-          <p:nvPr/>
-        </p:nvCxnSpPr>
-        <p:spPr>
-          <a:xfrm flipV="1">
-            <a:off x="1704592" y="3922190"/>
-            <a:ext cx="705616" cy="6349"/>
-          </a:xfrm>
-          <a:prstGeom prst="bentConnector3">
-            <a:avLst>
-              <a:gd name="adj1" fmla="val 50000"/>
-            </a:avLst>
-          </a:prstGeom>
-          <a:ln w="19050">
-            <a:solidFill>
-              <a:srgbClr val="0070C0"/>
-            </a:solidFill>
-            <a:prstDash val="dash"/>
-            <a:headEnd type="none" w="med" len="med"/>
-            <a:tailEnd type="arrow" w="med" len="med"/>
-          </a:ln>
-          <a:effectLst/>
-        </p:spPr>
-        <p:style>
-          <a:lnRef idx="1">
-            <a:schemeClr val="accent2"/>
-          </a:lnRef>
-          <a:fillRef idx="2">
-            <a:schemeClr val="accent2"/>
-          </a:fillRef>
-          <a:effectRef idx="1">
-            <a:schemeClr val="accent2"/>
-          </a:effectRef>
-          <a:fontRef idx="minor">
-            <a:schemeClr val="dk1"/>
-          </a:fontRef>
-        </p:style>
-      </p:cxnSp>
-      <p:cxnSp>
-        <p:nvCxnSpPr>
-          <p:cNvPr id="9" name="Elbow Connector 40"/>
-          <p:cNvCxnSpPr>
-            <a:stCxn id="5" idx="2"/>
-            <a:endCxn id="2" idx="1"/>
-          </p:cNvCxnSpPr>
-          <p:nvPr/>
-        </p:nvCxnSpPr>
-        <p:spPr>
-          <a:xfrm rot="16200000" flipH="1">
-            <a:off x="1617848" y="3841492"/>
-            <a:ext cx="484006" cy="1100711"/>
-          </a:xfrm>
-          <a:prstGeom prst="bentConnector2">
-            <a:avLst/>
-          </a:prstGeom>
-          <a:ln w="19050">
-            <a:solidFill>
-              <a:srgbClr val="0070C0"/>
-            </a:solidFill>
-            <a:prstDash val="dash"/>
-            <a:headEnd type="none" w="med" len="med"/>
-            <a:tailEnd type="arrow" w="med" len="med"/>
-          </a:ln>
-          <a:effectLst/>
-        </p:spPr>
-        <p:style>
-          <a:lnRef idx="1">
-            <a:schemeClr val="accent2"/>
-          </a:lnRef>
-          <a:fillRef idx="2">
-            <a:schemeClr val="accent2"/>
-          </a:fillRef>
-          <a:effectRef idx="1">
-            <a:schemeClr val="accent2"/>
-          </a:effectRef>
-          <a:fontRef idx="minor">
-            <a:schemeClr val="dk1"/>
-          </a:fontRef>
-        </p:style>
-      </p:cxnSp>
-      <p:sp>
-        <p:nvSpPr>
-          <p:cNvPr id="12" name="Rectangle 22"/>
-          <p:cNvSpPr/>
-          <p:nvPr/>
-        </p:nvSpPr>
-        <p:spPr>
-          <a:xfrm>
-            <a:off x="5830791" y="4439195"/>
-            <a:ext cx="790193" cy="346760"/>
-          </a:xfrm>
-          <a:prstGeom prst="rect">
-            <a:avLst/>
-          </a:prstGeom>
-          <a:solidFill>
-            <a:srgbClr val="00B050"/>
-          </a:solidFill>
-          <a:ln w="19050">
-            <a:solidFill>
-              <a:srgbClr val="00B050"/>
-            </a:solidFill>
-          </a:ln>
-          <a:effectLst/>
-        </p:spPr>
-        <p:style>
-          <a:lnRef idx="1">
-            <a:schemeClr val="accent2"/>
-          </a:lnRef>
-          <a:fillRef idx="2">
-            <a:schemeClr val="accent2"/>
-          </a:fillRef>
-          <a:effectRef idx="1">
-            <a:schemeClr val="accent2"/>
-          </a:effectRef>
-          <a:fontRef idx="minor">
-            <a:schemeClr val="dk1"/>
-          </a:fontRef>
-        </p:style>
-        <p:txBody>
-          <a:bodyPr rtlCol="0" anchor="ctr"/>
-          <a:lstStyle/>
-          <a:p>
-            <a:pPr algn="ctr"/>
-            <a:r>
-              <a:rPr lang="en-US" sz="1050" dirty="0" smtClean="0">
-                <a:solidFill>
-                  <a:schemeClr val="bg1"/>
-                </a:solidFill>
-              </a:rPr>
-              <a:t>{abstract}</a:t>
-            </a:r>
-            <a:br>
-              <a:rPr lang="en-US" sz="1050" dirty="0" smtClean="0">
-                <a:solidFill>
-                  <a:schemeClr val="bg1"/>
-                </a:solidFill>
-              </a:rPr>
-            </a:br>
-            <a:r>
-              <a:rPr lang="en-US" sz="1050" dirty="0" smtClean="0">
-                <a:solidFill>
-                  <a:schemeClr val="bg1"/>
-                </a:solidFill>
-              </a:rPr>
-              <a:t>Storage</a:t>
-            </a:r>
-            <a:endParaRPr lang="en-SG" sz="1050" dirty="0">
-              <a:solidFill>
-                <a:schemeClr val="bg1"/>
-              </a:solidFill>
-            </a:endParaRPr>
-          </a:p>
-        </p:txBody>
-      </p:sp>
-      <p:cxnSp>
-        <p:nvCxnSpPr>
-          <p:cNvPr id="13" name="Elbow Connector 40"/>
-          <p:cNvCxnSpPr>
-            <a:stCxn id="14" idx="2"/>
-            <a:endCxn id="12" idx="0"/>
-          </p:cNvCxnSpPr>
-          <p:nvPr/>
-        </p:nvCxnSpPr>
-        <p:spPr>
-          <a:xfrm rot="5400000">
-            <a:off x="6067401" y="4280707"/>
-            <a:ext cx="316975" cy="12700"/>
-          </a:xfrm>
-          <a:prstGeom prst="bentConnector3">
-            <a:avLst>
-              <a:gd name="adj1" fmla="val 50000"/>
-            </a:avLst>
-          </a:prstGeom>
-          <a:ln w="19050">
-            <a:solidFill>
-              <a:srgbClr val="0070C0"/>
-            </a:solidFill>
-            <a:headEnd type="none" w="med" len="med"/>
-            <a:tailEnd type="arrow" w="med" len="med"/>
-          </a:ln>
-          <a:effectLst/>
-        </p:spPr>
-        <p:style>
-          <a:lnRef idx="1">
-            <a:schemeClr val="accent2"/>
-          </a:lnRef>
-          <a:fillRef idx="2">
-            <a:schemeClr val="accent2"/>
-          </a:fillRef>
-          <a:effectRef idx="1">
-            <a:schemeClr val="accent2"/>
-          </a:effectRef>
-          <a:fontRef idx="minor">
-            <a:schemeClr val="dk1"/>
-          </a:fontRef>
-        </p:style>
-      </p:cxnSp>
-      <p:sp>
-        <p:nvSpPr>
-          <p:cNvPr id="14" name="Rectangle 65"/>
-          <p:cNvSpPr/>
-          <p:nvPr/>
-        </p:nvSpPr>
-        <p:spPr>
-          <a:xfrm>
-            <a:off x="5830792" y="3679608"/>
-            <a:ext cx="790192" cy="442612"/>
-          </a:xfrm>
-          <a:prstGeom prst="rect">
-            <a:avLst/>
-          </a:prstGeom>
-          <a:solidFill>
-            <a:srgbClr val="0070C0"/>
-          </a:solidFill>
-          <a:ln w="19050">
-            <a:solidFill>
-              <a:srgbClr val="0070C0"/>
-            </a:solidFill>
-          </a:ln>
-          <a:effectLst/>
-        </p:spPr>
-        <p:style>
-          <a:lnRef idx="1">
-            <a:schemeClr val="accent2"/>
-          </a:lnRef>
-          <a:fillRef idx="2">
-            <a:schemeClr val="accent2"/>
-          </a:fillRef>
-          <a:effectRef idx="1">
-            <a:schemeClr val="accent2"/>
-          </a:effectRef>
-          <a:fontRef idx="minor">
-            <a:schemeClr val="dk1"/>
-          </a:fontRef>
-        </p:style>
-        <p:txBody>
-          <a:bodyPr rtlCol="0" anchor="ctr"/>
-          <a:lstStyle/>
-          <a:p>
-            <a:pPr algn="ctr"/>
-            <a:r>
-              <a:rPr lang="en-US" sz="1050" dirty="0">
-                <a:solidFill>
-                  <a:schemeClr val="bg1"/>
-                </a:solidFill>
-              </a:rPr>
-              <a:t>Logic</a:t>
-            </a:r>
-            <a:endParaRPr lang="en-SG" sz="1050" dirty="0">
-              <a:solidFill>
-                <a:schemeClr val="bg1"/>
-              </a:solidFill>
-            </a:endParaRPr>
-          </a:p>
-        </p:txBody>
-      </p:sp>
-      <p:sp>
-        <p:nvSpPr>
-          <p:cNvPr id="15" name="Rectangle 65"/>
-          <p:cNvSpPr/>
-          <p:nvPr/>
-        </p:nvSpPr>
-        <p:spPr>
-          <a:xfrm>
-            <a:off x="4154391" y="3685957"/>
-            <a:ext cx="790192" cy="442612"/>
-          </a:xfrm>
-          <a:prstGeom prst="rect">
-            <a:avLst/>
-          </a:prstGeom>
-          <a:ln/>
-        </p:spPr>
-        <p:style>
-          <a:lnRef idx="2">
-            <a:schemeClr val="accent1"/>
-          </a:lnRef>
-          <a:fillRef idx="1">
-            <a:schemeClr val="lt1"/>
-          </a:fillRef>
-          <a:effectRef idx="0">
-            <a:schemeClr val="accent1"/>
-          </a:effectRef>
-          <a:fontRef idx="minor">
-            <a:schemeClr val="dk1"/>
-          </a:fontRef>
-        </p:style>
-        <p:txBody>
-          <a:bodyPr rtlCol="0" anchor="ctr"/>
-          <a:lstStyle/>
-          <a:p>
-            <a:pPr algn="ctr"/>
-            <a:r>
-              <a:rPr lang="en-US" sz="1050" dirty="0" err="1" smtClean="0">
-                <a:solidFill>
-                  <a:srgbClr val="0070C0"/>
-                </a:solidFill>
-              </a:rPr>
-              <a:t>LogicTest</a:t>
-            </a:r>
-            <a:endParaRPr lang="en-SG" sz="1050" dirty="0">
-              <a:solidFill>
-                <a:srgbClr val="0070C0"/>
-              </a:solidFill>
-            </a:endParaRPr>
-          </a:p>
-        </p:txBody>
-      </p:sp>
-      <p:cxnSp>
-        <p:nvCxnSpPr>
-          <p:cNvPr id="16" name="Elbow Connector 40"/>
-          <p:cNvCxnSpPr>
-            <a:stCxn id="15" idx="3"/>
-            <a:endCxn id="14" idx="1"/>
-          </p:cNvCxnSpPr>
-          <p:nvPr/>
-        </p:nvCxnSpPr>
-        <p:spPr>
-          <a:xfrm flipV="1">
-            <a:off x="4944583" y="3900914"/>
-            <a:ext cx="886209" cy="6349"/>
-          </a:xfrm>
-          <a:prstGeom prst="bentConnector3">
-            <a:avLst>
-              <a:gd name="adj1" fmla="val 50000"/>
-            </a:avLst>
-          </a:prstGeom>
-          <a:ln w="19050">
-            <a:solidFill>
-              <a:srgbClr val="0070C0"/>
-            </a:solidFill>
-            <a:prstDash val="dash"/>
-            <a:headEnd type="none" w="med" len="med"/>
-            <a:tailEnd type="arrow" w="med" len="med"/>
-          </a:ln>
-          <a:effectLst/>
-        </p:spPr>
-        <p:style>
-          <a:lnRef idx="1">
-            <a:schemeClr val="accent2"/>
-          </a:lnRef>
-          <a:fillRef idx="2">
-            <a:schemeClr val="accent2"/>
-          </a:fillRef>
-          <a:effectRef idx="1">
-            <a:schemeClr val="accent2"/>
-          </a:effectRef>
-          <a:fontRef idx="minor">
-            <a:schemeClr val="dk1"/>
-          </a:fontRef>
-        </p:style>
-      </p:cxnSp>
-      <p:cxnSp>
-        <p:nvCxnSpPr>
-          <p:cNvPr id="17" name="Elbow Connector 40"/>
-          <p:cNvCxnSpPr>
-            <a:stCxn id="15" idx="2"/>
-            <a:endCxn id="18" idx="1"/>
-          </p:cNvCxnSpPr>
-          <p:nvPr/>
-        </p:nvCxnSpPr>
-        <p:spPr>
-          <a:xfrm rot="16200000" flipH="1">
-            <a:off x="4113498" y="4564558"/>
-            <a:ext cx="1162683" cy="290704"/>
-          </a:xfrm>
-          <a:prstGeom prst="bentConnector2">
-            <a:avLst/>
-          </a:prstGeom>
-          <a:ln w="19050">
-            <a:solidFill>
-              <a:srgbClr val="0070C0"/>
-            </a:solidFill>
-            <a:prstDash val="dash"/>
-            <a:headEnd type="none" w="med" len="med"/>
-            <a:tailEnd type="arrow" w="med" len="med"/>
-          </a:ln>
-          <a:effectLst/>
-        </p:spPr>
-        <p:style>
-          <a:lnRef idx="1">
-            <a:schemeClr val="accent2"/>
-          </a:lnRef>
-          <a:fillRef idx="2">
-            <a:schemeClr val="accent2"/>
-          </a:fillRef>
-          <a:effectRef idx="1">
-            <a:schemeClr val="accent2"/>
-          </a:effectRef>
-          <a:fontRef idx="minor">
-            <a:schemeClr val="dk1"/>
-          </a:fontRef>
-        </p:style>
-      </p:cxnSp>
-      <p:sp>
-        <p:nvSpPr>
-          <p:cNvPr id="18" name="Rectangle 22"/>
-          <p:cNvSpPr/>
-          <p:nvPr/>
-        </p:nvSpPr>
-        <p:spPr>
-          <a:xfrm>
-            <a:off x="4840191" y="5117872"/>
-            <a:ext cx="865573" cy="346760"/>
-          </a:xfrm>
-          <a:prstGeom prst="rect">
-            <a:avLst/>
-          </a:prstGeom>
-          <a:noFill/>
-          <a:ln w="19050">
-            <a:solidFill>
-              <a:srgbClr val="00B050"/>
-            </a:solidFill>
-          </a:ln>
-          <a:effectLst/>
-        </p:spPr>
-        <p:style>
-          <a:lnRef idx="1">
-            <a:schemeClr val="accent2"/>
-          </a:lnRef>
-          <a:fillRef idx="2">
-            <a:schemeClr val="accent2"/>
-          </a:fillRef>
-          <a:effectRef idx="1">
-            <a:schemeClr val="accent2"/>
-          </a:effectRef>
-          <a:fontRef idx="minor">
-            <a:schemeClr val="dk1"/>
-          </a:fontRef>
-        </p:style>
-        <p:txBody>
-          <a:bodyPr rtlCol="0" anchor="ctr"/>
-          <a:lstStyle/>
-          <a:p>
-            <a:pPr algn="ctr"/>
-            <a:r>
-              <a:rPr lang="en-US" sz="1050" dirty="0" err="1" smtClean="0">
-                <a:solidFill>
-                  <a:srgbClr val="00B050"/>
-                </a:solidFill>
-              </a:rPr>
-              <a:t>StorageStub</a:t>
-            </a:r>
-            <a:endParaRPr lang="en-SG" sz="1050" dirty="0">
-              <a:solidFill>
-                <a:srgbClr val="00B050"/>
-              </a:solidFill>
-            </a:endParaRPr>
-          </a:p>
-        </p:txBody>
-      </p:sp>
-      <p:sp>
-        <p:nvSpPr>
-          <p:cNvPr id="19" name="Rectangle 22"/>
-          <p:cNvSpPr/>
-          <p:nvPr/>
-        </p:nvSpPr>
-        <p:spPr>
-          <a:xfrm>
-            <a:off x="5763827" y="5117872"/>
-            <a:ext cx="865573" cy="346760"/>
-          </a:xfrm>
-          <a:prstGeom prst="rect">
-            <a:avLst/>
-          </a:prstGeom>
-          <a:solidFill>
-            <a:srgbClr val="00B050"/>
-          </a:solidFill>
-          <a:ln w="19050">
-            <a:solidFill>
-              <a:srgbClr val="00B050"/>
-            </a:solidFill>
-          </a:ln>
-          <a:effectLst/>
-        </p:spPr>
-        <p:style>
-          <a:lnRef idx="1">
-            <a:schemeClr val="accent2"/>
-          </a:lnRef>
-          <a:fillRef idx="2">
-            <a:schemeClr val="accent2"/>
-          </a:fillRef>
-          <a:effectRef idx="1">
-            <a:schemeClr val="accent2"/>
-          </a:effectRef>
-          <a:fontRef idx="minor">
-            <a:schemeClr val="dk1"/>
-          </a:fontRef>
-        </p:style>
-        <p:txBody>
-          <a:bodyPr rtlCol="0" anchor="ctr"/>
-          <a:lstStyle/>
-          <a:p>
-            <a:pPr algn="ctr"/>
-            <a:r>
-              <a:rPr lang="en-US" sz="1050" dirty="0" err="1" smtClean="0">
-                <a:solidFill>
-                  <a:schemeClr val="bg1"/>
-                </a:solidFill>
-              </a:rPr>
-              <a:t>StorageFile</a:t>
-            </a:r>
-            <a:endParaRPr lang="en-SG" sz="1050" dirty="0">
-              <a:solidFill>
-                <a:schemeClr val="bg1"/>
-              </a:solidFill>
-            </a:endParaRPr>
-          </a:p>
-        </p:txBody>
-      </p:sp>
-      <p:sp>
-        <p:nvSpPr>
-          <p:cNvPr id="21" name="Isosceles Triangle 102"/>
-          <p:cNvSpPr/>
-          <p:nvPr/>
-        </p:nvSpPr>
-        <p:spPr>
-          <a:xfrm rot="10800000" flipV="1">
-            <a:off x="6063663" y="4785955"/>
-            <a:ext cx="270504" cy="175523"/>
-          </a:xfrm>
-          <a:prstGeom prst="triangle">
-            <a:avLst/>
-          </a:prstGeom>
-          <a:ln>
-            <a:solidFill>
-              <a:srgbClr val="00B050"/>
-            </a:solidFill>
-          </a:ln>
-          <a:effectLst/>
-        </p:spPr>
-        <p:style>
-          <a:lnRef idx="1">
-            <a:schemeClr val="accent3"/>
-          </a:lnRef>
-          <a:fillRef idx="2">
-            <a:schemeClr val="accent3"/>
-          </a:fillRef>
-          <a:effectRef idx="1">
-            <a:schemeClr val="accent3"/>
-          </a:effectRef>
-          <a:fontRef idx="minor">
-            <a:schemeClr val="dk1"/>
-          </a:fontRef>
-        </p:style>
-        <p:txBody>
-          <a:bodyPr rtlCol="0" anchor="ctr"/>
-          <a:lstStyle/>
-          <a:p>
-            <a:pPr algn="ctr"/>
-            <a:endParaRPr lang="en-SG" sz="1050"/>
-          </a:p>
-        </p:txBody>
-      </p:sp>
-      <p:cxnSp>
-        <p:nvCxnSpPr>
-          <p:cNvPr id="22" name="Elbow Connector 103"/>
-          <p:cNvCxnSpPr>
-            <a:stCxn id="21" idx="3"/>
-            <a:endCxn id="18" idx="0"/>
-          </p:cNvCxnSpPr>
-          <p:nvPr/>
-        </p:nvCxnSpPr>
-        <p:spPr>
-          <a:xfrm rot="5400000">
-            <a:off x="5657750" y="4576707"/>
-            <a:ext cx="156394" cy="925937"/>
-          </a:xfrm>
-          <a:prstGeom prst="bentConnector3">
-            <a:avLst>
-              <a:gd name="adj1" fmla="val 50000"/>
-            </a:avLst>
-          </a:prstGeom>
-          <a:ln w="19050">
-            <a:solidFill>
-              <a:srgbClr val="00B050"/>
-            </a:solidFill>
-            <a:prstDash val="solid"/>
-            <a:headEnd type="none" w="med" len="med"/>
-            <a:tailEnd type="none" w="med" len="med"/>
-          </a:ln>
-          <a:effectLst/>
-        </p:spPr>
-        <p:style>
-          <a:lnRef idx="1">
-            <a:schemeClr val="accent2"/>
-          </a:lnRef>
-          <a:fillRef idx="2">
-            <a:schemeClr val="accent2"/>
-          </a:fillRef>
-          <a:effectRef idx="1">
-            <a:schemeClr val="accent2"/>
-          </a:effectRef>
-          <a:fontRef idx="minor">
-            <a:schemeClr val="dk1"/>
-          </a:fontRef>
-        </p:style>
-      </p:cxnSp>
-      <p:cxnSp>
-        <p:nvCxnSpPr>
-          <p:cNvPr id="24" name="Elbow Connector 103"/>
-          <p:cNvCxnSpPr>
-            <a:stCxn id="21" idx="3"/>
-            <a:endCxn id="19" idx="0"/>
-          </p:cNvCxnSpPr>
-          <p:nvPr/>
-        </p:nvCxnSpPr>
-        <p:spPr>
-          <a:xfrm rot="5400000">
-            <a:off x="6119568" y="5038525"/>
-            <a:ext cx="156394" cy="2301"/>
-          </a:xfrm>
-          <a:prstGeom prst="bentConnector3">
-            <a:avLst>
-              <a:gd name="adj1" fmla="val 50000"/>
-            </a:avLst>
-          </a:prstGeom>
-          <a:ln w="19050">
-            <a:solidFill>
-              <a:srgbClr val="00B050"/>
-            </a:solidFill>
-            <a:prstDash val="solid"/>
-            <a:headEnd type="none" w="med" len="med"/>
-            <a:tailEnd type="none" w="med" len="med"/>
-          </a:ln>
-          <a:effectLst/>
-        </p:spPr>
-        <p:style>
-          <a:lnRef idx="1">
-            <a:schemeClr val="accent2"/>
-          </a:lnRef>
-          <a:fillRef idx="2">
-            <a:schemeClr val="accent2"/>
-          </a:fillRef>
-          <a:effectRef idx="1">
-            <a:schemeClr val="accent2"/>
-          </a:effectRef>
-          <a:fontRef idx="minor">
-            <a:schemeClr val="dk1"/>
-          </a:fontRef>
-        </p:style>
-      </p:cxnSp>
-      <p:sp>
-        <p:nvSpPr>
-          <p:cNvPr id="27" name="Striped Right Arrow 26"/>
-          <p:cNvSpPr/>
-          <p:nvPr/>
-        </p:nvSpPr>
-        <p:spPr>
-          <a:xfrm>
-            <a:off x="3505200" y="4122220"/>
-            <a:ext cx="304800" cy="269627"/>
-          </a:xfrm>
-          <a:prstGeom prst="stripedRightArrow">
-            <a:avLst/>
-          </a:prstGeom>
-          <a:solidFill>
-            <a:schemeClr val="bg1">
-              <a:lumMod val="75000"/>
-            </a:schemeClr>
-          </a:solidFill>
-          <a:ln>
-            <a:noFill/>
-          </a:ln>
-        </p:spPr>
-        <p:style>
-          <a:lnRef idx="2">
-            <a:schemeClr val="accent1">
-              <a:shade val="50000"/>
-            </a:schemeClr>
-          </a:lnRef>
-          <a:fillRef idx="1">
-            <a:schemeClr val="accent1"/>
-          </a:fillRef>
-          <a:effectRef idx="0">
-            <a:schemeClr val="accent1"/>
-          </a:effectRef>
-          <a:fontRef idx="minor">
-            <a:schemeClr val="lt1"/>
-          </a:fontRef>
-        </p:style>
-        <p:txBody>
-          <a:bodyPr rtlCol="0" anchor="ctr"/>
-          <a:lstStyle/>
-          <a:p>
-            <a:pPr algn="ctr"/>
-            <a:endParaRPr lang="en-SG"/>
-          </a:p>
-        </p:txBody>
-      </p:sp>
-      <p:sp>
-        <p:nvSpPr>
-          <p:cNvPr id="20" name="Rectangle 22"/>
-          <p:cNvSpPr/>
-          <p:nvPr/>
-        </p:nvSpPr>
-        <p:spPr>
-          <a:xfrm>
-            <a:off x="2209799" y="1750187"/>
-            <a:ext cx="790193" cy="346760"/>
-          </a:xfrm>
-          <a:prstGeom prst="rect">
-            <a:avLst/>
-          </a:prstGeom>
-          <a:solidFill>
-            <a:srgbClr val="00B050"/>
-          </a:solidFill>
-          <a:ln w="19050">
-            <a:solidFill>
-              <a:srgbClr val="00B050"/>
-            </a:solidFill>
-          </a:ln>
-          <a:effectLst/>
-        </p:spPr>
-        <p:style>
-          <a:lnRef idx="1">
-            <a:schemeClr val="accent2"/>
-          </a:lnRef>
-          <a:fillRef idx="2">
-            <a:schemeClr val="accent2"/>
-          </a:fillRef>
-          <a:effectRef idx="1">
-            <a:schemeClr val="accent2"/>
-          </a:effectRef>
-          <a:fontRef idx="minor">
-            <a:schemeClr val="dk1"/>
-          </a:fontRef>
-        </p:style>
-        <p:txBody>
-          <a:bodyPr rtlCol="0" anchor="ctr"/>
-          <a:lstStyle/>
-          <a:p>
-            <a:pPr algn="ctr"/>
-            <a:r>
-              <a:rPr lang="en-US" sz="1050" dirty="0" err="1">
-                <a:solidFill>
-                  <a:schemeClr val="bg1"/>
-                </a:solidFill>
-              </a:rPr>
-              <a:t>StorageFile</a:t>
-            </a:r>
-            <a:endParaRPr lang="en-SG" sz="1050" dirty="0">
-              <a:solidFill>
-                <a:schemeClr val="bg1"/>
-              </a:solidFill>
-            </a:endParaRPr>
-          </a:p>
-        </p:txBody>
-      </p:sp>
-      <p:cxnSp>
-        <p:nvCxnSpPr>
-          <p:cNvPr id="23" name="Elbow Connector 40"/>
-          <p:cNvCxnSpPr>
-            <a:stCxn id="25" idx="2"/>
-            <a:endCxn id="20" idx="0"/>
-          </p:cNvCxnSpPr>
-          <p:nvPr/>
-        </p:nvCxnSpPr>
-        <p:spPr>
-          <a:xfrm rot="16200000" flipH="1">
-            <a:off x="2446408" y="1591698"/>
-            <a:ext cx="316975" cy="1"/>
-          </a:xfrm>
-          <a:prstGeom prst="bentConnector3">
-            <a:avLst>
-              <a:gd name="adj1" fmla="val 50000"/>
-            </a:avLst>
-          </a:prstGeom>
-          <a:ln w="19050">
-            <a:solidFill>
-              <a:srgbClr val="0070C0"/>
-            </a:solidFill>
-            <a:headEnd type="none" w="med" len="med"/>
-            <a:tailEnd type="arrow" w="med" len="med"/>
-          </a:ln>
-          <a:effectLst/>
-        </p:spPr>
-        <p:style>
-          <a:lnRef idx="1">
-            <a:schemeClr val="accent2"/>
-          </a:lnRef>
-          <a:fillRef idx="2">
-            <a:schemeClr val="accent2"/>
-          </a:fillRef>
-          <a:effectRef idx="1">
-            <a:schemeClr val="accent2"/>
-          </a:effectRef>
-          <a:fontRef idx="minor">
-            <a:schemeClr val="dk1"/>
-          </a:fontRef>
-        </p:style>
-      </p:cxnSp>
-      <p:sp>
-        <p:nvSpPr>
-          <p:cNvPr id="25" name="Rectangle 65"/>
-          <p:cNvSpPr/>
-          <p:nvPr/>
-        </p:nvSpPr>
-        <p:spPr>
-          <a:xfrm>
-            <a:off x="2209799" y="990600"/>
-            <a:ext cx="790192" cy="442612"/>
-          </a:xfrm>
-          <a:prstGeom prst="rect">
-            <a:avLst/>
-          </a:prstGeom>
-          <a:solidFill>
-            <a:srgbClr val="0070C0"/>
-          </a:solidFill>
-          <a:ln w="19050">
-            <a:solidFill>
-              <a:srgbClr val="0070C0"/>
-            </a:solidFill>
-          </a:ln>
-          <a:effectLst/>
-        </p:spPr>
-        <p:style>
-          <a:lnRef idx="1">
-            <a:schemeClr val="accent2"/>
-          </a:lnRef>
-          <a:fillRef idx="2">
-            <a:schemeClr val="accent2"/>
-          </a:fillRef>
-          <a:effectRef idx="1">
-            <a:schemeClr val="accent2"/>
-          </a:effectRef>
-          <a:fontRef idx="minor">
-            <a:schemeClr val="dk1"/>
-          </a:fontRef>
-        </p:style>
-        <p:txBody>
-          <a:bodyPr rtlCol="0" anchor="ctr"/>
-          <a:lstStyle/>
-          <a:p>
-            <a:pPr algn="ctr"/>
-            <a:r>
-              <a:rPr lang="en-US" sz="1050" dirty="0">
-                <a:solidFill>
-                  <a:schemeClr val="bg1"/>
-                </a:solidFill>
-              </a:rPr>
-              <a:t>Logic</a:t>
-            </a:r>
-            <a:endParaRPr lang="en-SG" sz="1050" dirty="0">
-              <a:solidFill>
-                <a:schemeClr val="bg1"/>
-              </a:solidFill>
-            </a:endParaRPr>
-          </a:p>
-        </p:txBody>
-      </p:sp>
-      <p:sp>
-        <p:nvSpPr>
-          <p:cNvPr id="30" name="Rectangle 22"/>
-          <p:cNvSpPr/>
-          <p:nvPr/>
-        </p:nvSpPr>
-        <p:spPr>
-          <a:xfrm>
-            <a:off x="4270468" y="1719833"/>
-            <a:ext cx="790193" cy="346760"/>
-          </a:xfrm>
-          <a:prstGeom prst="rect">
-            <a:avLst/>
-          </a:prstGeom>
-          <a:solidFill>
-            <a:srgbClr val="00B050"/>
-          </a:solidFill>
-          <a:ln w="19050">
-            <a:solidFill>
-              <a:srgbClr val="00B050"/>
-            </a:solidFill>
-          </a:ln>
-          <a:effectLst/>
-        </p:spPr>
-        <p:style>
-          <a:lnRef idx="1">
-            <a:schemeClr val="accent2"/>
-          </a:lnRef>
-          <a:fillRef idx="2">
-            <a:schemeClr val="accent2"/>
-          </a:fillRef>
-          <a:effectRef idx="1">
-            <a:schemeClr val="accent2"/>
-          </a:effectRef>
-          <a:fontRef idx="minor">
-            <a:schemeClr val="dk1"/>
-          </a:fontRef>
-        </p:style>
-        <p:txBody>
-          <a:bodyPr rtlCol="0" anchor="ctr"/>
-          <a:lstStyle/>
-          <a:p>
-            <a:pPr algn="ctr"/>
-            <a:r>
-              <a:rPr lang="en-US" sz="1050" dirty="0" smtClean="0">
-                <a:solidFill>
-                  <a:schemeClr val="bg1"/>
-                </a:solidFill>
-              </a:rPr>
-              <a:t>{abstract}</a:t>
-            </a:r>
-            <a:br>
-              <a:rPr lang="en-US" sz="1050" dirty="0" smtClean="0">
-                <a:solidFill>
-                  <a:schemeClr val="bg1"/>
-                </a:solidFill>
-              </a:rPr>
-            </a:br>
-            <a:r>
-              <a:rPr lang="en-US" sz="1050" dirty="0" smtClean="0">
-                <a:solidFill>
-                  <a:schemeClr val="bg1"/>
-                </a:solidFill>
-              </a:rPr>
-              <a:t>Storage</a:t>
-            </a:r>
-            <a:endParaRPr lang="en-SG" sz="1050" dirty="0">
-              <a:solidFill>
-                <a:schemeClr val="bg1"/>
-              </a:solidFill>
-            </a:endParaRPr>
-          </a:p>
-        </p:txBody>
-      </p:sp>
-      <p:cxnSp>
-        <p:nvCxnSpPr>
-          <p:cNvPr id="31" name="Elbow Connector 40"/>
-          <p:cNvCxnSpPr>
-            <a:stCxn id="32" idx="2"/>
-            <a:endCxn id="30" idx="0"/>
-          </p:cNvCxnSpPr>
-          <p:nvPr/>
-        </p:nvCxnSpPr>
-        <p:spPr>
-          <a:xfrm rot="16200000" flipH="1">
-            <a:off x="4507077" y="1561344"/>
-            <a:ext cx="316975" cy="1"/>
-          </a:xfrm>
-          <a:prstGeom prst="bentConnector3">
-            <a:avLst>
-              <a:gd name="adj1" fmla="val 50000"/>
-            </a:avLst>
-          </a:prstGeom>
-          <a:ln w="19050">
-            <a:solidFill>
-              <a:srgbClr val="0070C0"/>
-            </a:solidFill>
-            <a:headEnd type="none" w="med" len="med"/>
-            <a:tailEnd type="arrow" w="med" len="med"/>
-          </a:ln>
-          <a:effectLst/>
-        </p:spPr>
-        <p:style>
-          <a:lnRef idx="1">
-            <a:schemeClr val="accent2"/>
-          </a:lnRef>
-          <a:fillRef idx="2">
-            <a:schemeClr val="accent2"/>
-          </a:fillRef>
-          <a:effectRef idx="1">
-            <a:schemeClr val="accent2"/>
-          </a:effectRef>
-          <a:fontRef idx="minor">
-            <a:schemeClr val="dk1"/>
-          </a:fontRef>
-        </p:style>
-      </p:cxnSp>
-      <p:sp>
-        <p:nvSpPr>
-          <p:cNvPr id="32" name="Rectangle 65"/>
-          <p:cNvSpPr/>
-          <p:nvPr/>
-        </p:nvSpPr>
-        <p:spPr>
-          <a:xfrm>
-            <a:off x="4270468" y="960246"/>
-            <a:ext cx="790192" cy="442612"/>
-          </a:xfrm>
-          <a:prstGeom prst="rect">
-            <a:avLst/>
-          </a:prstGeom>
-          <a:solidFill>
-            <a:srgbClr val="0070C0"/>
-          </a:solidFill>
-          <a:ln w="19050">
-            <a:solidFill>
-              <a:srgbClr val="0070C0"/>
-            </a:solidFill>
-          </a:ln>
-          <a:effectLst/>
-        </p:spPr>
-        <p:style>
-          <a:lnRef idx="1">
-            <a:schemeClr val="accent2"/>
-          </a:lnRef>
-          <a:fillRef idx="2">
-            <a:schemeClr val="accent2"/>
-          </a:fillRef>
-          <a:effectRef idx="1">
-            <a:schemeClr val="accent2"/>
-          </a:effectRef>
-          <a:fontRef idx="minor">
-            <a:schemeClr val="dk1"/>
-          </a:fontRef>
-        </p:style>
-        <p:txBody>
-          <a:bodyPr rtlCol="0" anchor="ctr"/>
-          <a:lstStyle/>
-          <a:p>
-            <a:pPr algn="ctr"/>
-            <a:r>
-              <a:rPr lang="en-US" sz="1050" dirty="0">
-                <a:solidFill>
-                  <a:schemeClr val="bg1"/>
-                </a:solidFill>
-              </a:rPr>
-              <a:t>Logic</a:t>
-            </a:r>
-            <a:endParaRPr lang="en-SG" sz="1050" dirty="0">
-              <a:solidFill>
-                <a:schemeClr val="bg1"/>
-              </a:solidFill>
-            </a:endParaRPr>
-          </a:p>
-        </p:txBody>
-      </p:sp>
-      <p:sp>
-        <p:nvSpPr>
-          <p:cNvPr id="37" name="Rectangle 22"/>
-          <p:cNvSpPr/>
-          <p:nvPr/>
-        </p:nvSpPr>
-        <p:spPr>
-          <a:xfrm>
-            <a:off x="4232778" y="2398510"/>
-            <a:ext cx="865573" cy="346760"/>
-          </a:xfrm>
-          <a:prstGeom prst="rect">
-            <a:avLst/>
-          </a:prstGeom>
-          <a:solidFill>
-            <a:srgbClr val="00B050"/>
-          </a:solidFill>
-          <a:ln w="19050">
-            <a:solidFill>
-              <a:srgbClr val="00B050"/>
-            </a:solidFill>
-          </a:ln>
-          <a:effectLst/>
-        </p:spPr>
-        <p:style>
-          <a:lnRef idx="1">
-            <a:schemeClr val="accent2"/>
-          </a:lnRef>
-          <a:fillRef idx="2">
-            <a:schemeClr val="accent2"/>
-          </a:fillRef>
-          <a:effectRef idx="1">
-            <a:schemeClr val="accent2"/>
-          </a:effectRef>
-          <a:fontRef idx="minor">
-            <a:schemeClr val="dk1"/>
-          </a:fontRef>
-        </p:style>
-        <p:txBody>
-          <a:bodyPr rtlCol="0" anchor="ctr"/>
-          <a:lstStyle/>
-          <a:p>
-            <a:pPr algn="ctr"/>
-            <a:r>
-              <a:rPr lang="en-US" sz="1050" dirty="0" err="1" smtClean="0">
-                <a:solidFill>
-                  <a:schemeClr val="bg1"/>
-                </a:solidFill>
-              </a:rPr>
-              <a:t>StorageFile</a:t>
-            </a:r>
-            <a:endParaRPr lang="en-SG" sz="1050" dirty="0">
-              <a:solidFill>
-                <a:schemeClr val="bg1"/>
-              </a:solidFill>
-            </a:endParaRPr>
-          </a:p>
-        </p:txBody>
-      </p:sp>
-      <p:sp>
-        <p:nvSpPr>
-          <p:cNvPr id="38" name="Isosceles Triangle 102"/>
-          <p:cNvSpPr/>
-          <p:nvPr/>
-        </p:nvSpPr>
-        <p:spPr>
-          <a:xfrm rot="10800000" flipV="1">
-            <a:off x="4530312" y="2066593"/>
-            <a:ext cx="270504" cy="175523"/>
-          </a:xfrm>
-          <a:prstGeom prst="triangle">
-            <a:avLst/>
-          </a:prstGeom>
-          <a:ln>
-            <a:solidFill>
-              <a:srgbClr val="00B050"/>
-            </a:solidFill>
-          </a:ln>
-          <a:effectLst/>
-        </p:spPr>
-        <p:style>
-          <a:lnRef idx="1">
-            <a:schemeClr val="accent3"/>
-          </a:lnRef>
-          <a:fillRef idx="2">
-            <a:schemeClr val="accent3"/>
-          </a:fillRef>
-          <a:effectRef idx="1">
-            <a:schemeClr val="accent3"/>
-          </a:effectRef>
-          <a:fontRef idx="minor">
-            <a:schemeClr val="dk1"/>
-          </a:fontRef>
-        </p:style>
-        <p:txBody>
-          <a:bodyPr rtlCol="0" anchor="ctr"/>
-          <a:lstStyle/>
-          <a:p>
-            <a:pPr algn="ctr"/>
-            <a:endParaRPr lang="en-SG" sz="1050"/>
-          </a:p>
-        </p:txBody>
-      </p:sp>
-      <p:cxnSp>
-        <p:nvCxnSpPr>
-          <p:cNvPr id="40" name="Elbow Connector 103"/>
-          <p:cNvCxnSpPr>
-            <a:stCxn id="38" idx="3"/>
-            <a:endCxn id="37" idx="0"/>
-          </p:cNvCxnSpPr>
-          <p:nvPr/>
-        </p:nvCxnSpPr>
-        <p:spPr>
-          <a:xfrm rot="16200000" flipH="1">
-            <a:off x="4587367" y="2320312"/>
-            <a:ext cx="156394" cy="1"/>
-          </a:xfrm>
-          <a:prstGeom prst="bentConnector3">
-            <a:avLst>
-              <a:gd name="adj1" fmla="val 50000"/>
-            </a:avLst>
-          </a:prstGeom>
-          <a:ln w="19050">
-            <a:solidFill>
-              <a:srgbClr val="00B050"/>
-            </a:solidFill>
-            <a:prstDash val="solid"/>
-            <a:headEnd type="none" w="med" len="med"/>
-            <a:tailEnd type="none" w="med" len="med"/>
-          </a:ln>
-          <a:effectLst/>
-        </p:spPr>
-        <p:style>
-          <a:lnRef idx="1">
-            <a:schemeClr val="accent2"/>
-          </a:lnRef>
-          <a:fillRef idx="2">
-            <a:schemeClr val="accent2"/>
-          </a:fillRef>
-          <a:effectRef idx="1">
-            <a:schemeClr val="accent2"/>
-          </a:effectRef>
-          <a:fontRef idx="minor">
-            <a:schemeClr val="dk1"/>
-          </a:fontRef>
-        </p:style>
-      </p:cxnSp>
-      <p:sp>
-        <p:nvSpPr>
-          <p:cNvPr id="41" name="Striped Right Arrow 40"/>
-          <p:cNvSpPr/>
-          <p:nvPr/>
-        </p:nvSpPr>
-        <p:spPr>
-          <a:xfrm>
-            <a:off x="3498756" y="1402858"/>
-            <a:ext cx="304800" cy="269627"/>
-          </a:xfrm>
-          <a:prstGeom prst="stripedRightArrow">
-            <a:avLst/>
-          </a:prstGeom>
-          <a:solidFill>
-            <a:schemeClr val="bg1">
-              <a:lumMod val="75000"/>
-            </a:schemeClr>
-          </a:solidFill>
-          <a:ln>
-            <a:noFill/>
-          </a:ln>
-        </p:spPr>
-        <p:style>
-          <a:lnRef idx="2">
-            <a:schemeClr val="accent1">
-              <a:shade val="50000"/>
-            </a:schemeClr>
-          </a:lnRef>
-          <a:fillRef idx="1">
-            <a:schemeClr val="accent1"/>
-          </a:fillRef>
-          <a:effectRef idx="0">
-            <a:schemeClr val="accent1"/>
-          </a:effectRef>
-          <a:fontRef idx="minor">
-            <a:schemeClr val="lt1"/>
-          </a:fontRef>
-        </p:style>
-        <p:txBody>
-          <a:bodyPr rtlCol="0" anchor="ctr"/>
-          <a:lstStyle/>
-          <a:p>
-            <a:pPr algn="ctr"/>
-            <a:endParaRPr lang="en-SG"/>
-          </a:p>
-        </p:txBody>
-      </p:sp>
-    </p:spTree>
-    <p:extLst>
-      <p:ext uri="{BB962C8B-B14F-4D97-AF65-F5344CB8AC3E}">
-        <p14:creationId xmlns:p14="http://schemas.microsoft.com/office/powerpoint/2010/main" val="2619388383"/>
-      </p:ext>
-    </p:extLst>
-  </p:cSld>
-  <p:clrMapOvr>
-    <a:masterClrMapping/>
-  </p:clrMapOvr>
+  <p:timing>
+    <p:tnLst>
+      <p:par>
+        <p:cTn id="1" dur="indefinite" restart="never" nodeType="tmRoot"/>
+      </p:par>
+    </p:tnLst>
+  </p:timing>
 </p:sld>
 </file>
 

</xml_diff>